<commit_message>
add spm 3 march lecture and modify cgi dda algo
</commit_message>
<xml_diff>
--- a/Computer Graphics and Image Processing/Slides/0_3_Scan_Conversion_Algo_Examples.pptx
+++ b/Computer Graphics and Image Processing/Slides/0_3_Scan_Conversion_Algo_Examples.pptx
@@ -211,7 +211,7 @@
           <a:p>
             <a:fld id="{1D8BD707-D9CF-40AE-B4C6-C98DA3205C09}" type="datetimeFigureOut">
               <a:rPr lang="en-US"/>
-              <a:t>1/31/2024</a:t>
+              <a:t>3/8/2024</a:t>
             </a:fld>
             <a:endParaRPr lang="en-US"/>
           </a:p>
@@ -388,7 +388,7 @@
           <a:p>
             <a:fld id="{1D8BD707-D9CF-40AE-B4C6-C98DA3205C09}" type="datetimeFigureOut">
               <a:rPr lang="en-US"/>
-              <a:t>1/31/2024</a:t>
+              <a:t>3/8/2024</a:t>
             </a:fld>
             <a:endParaRPr lang="en-US"/>
           </a:p>
@@ -602,7 +602,7 @@
           <a:p>
             <a:fld id="{1D8BD707-D9CF-40AE-B4C6-C98DA3205C09}" type="datetimeFigureOut">
               <a:rPr lang="en-US"/>
-              <a:t>1/31/2024</a:t>
+              <a:t>3/8/2024</a:t>
             </a:fld>
             <a:endParaRPr lang="en-US"/>
           </a:p>
@@ -750,7 +750,7 @@
           <a:p>
             <a:fld id="{1D8BD707-D9CF-40AE-B4C6-C98DA3205C09}" type="datetimeFigureOut">
               <a:rPr lang="en-US"/>
-              <a:t>1/31/2024</a:t>
+              <a:t>3/8/2024</a:t>
             </a:fld>
             <a:endParaRPr lang="en-US"/>
           </a:p>
@@ -1072,7 +1072,7 @@
           <a:p>
             <a:fld id="{1D8BD707-D9CF-40AE-B4C6-C98DA3205C09}" type="datetimeFigureOut">
               <a:rPr lang="en-US"/>
-              <a:t>1/31/2024</a:t>
+              <a:t>3/8/2024</a:t>
             </a:fld>
             <a:endParaRPr lang="en-US"/>
           </a:p>
@@ -1486,7 +1486,7 @@
           <a:p>
             <a:fld id="{1D8BD707-D9CF-40AE-B4C6-C98DA3205C09}" type="datetimeFigureOut">
               <a:rPr lang="en-US"/>
-              <a:t>1/31/2024</a:t>
+              <a:t>3/8/2024</a:t>
             </a:fld>
             <a:endParaRPr lang="en-US"/>
           </a:p>

</xml_diff>